<commit_message>
latest first lesson updates
</commit_message>
<xml_diff>
--- a/01-Introduction-into-Course.pptx
+++ b/01-Introduction-into-Course.pptx
@@ -3469,9 +3469,6 @@
                 </a:solidFill>
               </a:defRPr>
             </a:pPr>
-            <a:r>
-              <a:t>Всяка понеделник и сряда 19:30 – 22:30 </a:t>
-            </a:r>
           </a:p>
           <a:p>
             <a:pPr>
@@ -3484,7 +3481,7 @@
               </a:defRPr>
             </a:pPr>
             <a:r>
-              <a:t>16. 11. 2015 – 04. 09. 2015 – занимания</a:t>
+              <a:t>Всяка понеделник и сряда 19:30 – 22:30 </a:t>
             </a:r>
           </a:p>
           <a:p>
@@ -3498,7 +3495,7 @@
               </a:defRPr>
             </a:pPr>
             <a:r>
-              <a:t>09. 09. 2015 – подготовка за изпит</a:t>
+              <a:t>занимания</a:t>
             </a:r>
           </a:p>
           <a:p>
@@ -3512,7 +3509,21 @@
               </a:defRPr>
             </a:pPr>
             <a:r>
-              <a:t>11. 09. 2015 – изпит (тест и задача)</a:t>
+              <a:t>подготовка за изпит</a:t>
+            </a:r>
+          </a:p>
+          <a:p>
+            <a:pPr>
+              <a:buFont typeface="Wingdings"/>
+              <a:buChar char="▪"/>
+              <a:defRPr>
+                <a:solidFill>
+                  <a:srgbClr val="F2F2F2"/>
+                </a:solidFill>
+              </a:defRPr>
+            </a:pPr>
+            <a:r>
+              <a:t>изпит (тест и задача)</a:t>
             </a:r>
           </a:p>
         </p:txBody>

</xml_diff>